<commit_message>
adicionando imagem abaixo dos topicos
</commit_message>
<xml_diff>
--- a/Slides/roteiro_apresentacao.pptx
+++ b/Slides/roteiro_apresentacao.pptx
@@ -7,6 +7,7 @@
   <p:sldIdLst>
     <p:sldId id="256" r:id="rId7"/>
     <p:sldId id="257" r:id="rId8"/>
+    <p:sldId id="258" r:id="rId9"/>
   </p:sldIdLst>
   <p:sldSz cx="9144000" cy="6858000" type="screen4x3"/>
   <p:notesSz cx="6858000" cy="9144000"/>
@@ -3201,6 +3202,108 @@
           </a:p>
         </p:txBody>
       </p:sp>
+    </p:spTree>
+  </p:cSld>
+  <p:clrMapOvr>
+    <a:masterClrMapping/>
+  </p:clrMapOvr>
+</p:sld>
+</file>
+
+<file path=ppt/slides/slide3.xml><?xml version="1.0" encoding="utf-8"?>
+<p:sld xmlns:a="http://schemas.openxmlformats.org/drawingml/2006/main" xmlns:p="http://schemas.openxmlformats.org/presentationml/2006/main" xmlns:r="http://schemas.openxmlformats.org/officeDocument/2006/relationships">
+  <p:cSld>
+    <p:spTree>
+      <p:nvGrpSpPr>
+        <p:cNvPr id="1" name=""/>
+        <p:cNvGrpSpPr/>
+        <p:nvPr/>
+      </p:nvGrpSpPr>
+      <p:grpSpPr/>
+      <p:sp>
+        <p:nvSpPr>
+          <p:cNvPr id="2" name="Title 1"/>
+          <p:cNvSpPr>
+            <a:spLocks noGrp="1"/>
+          </p:cNvSpPr>
+          <p:nvPr>
+            <p:ph type="title"/>
+          </p:nvPr>
+        </p:nvSpPr>
+        <p:spPr/>
+        <p:txBody>
+          <a:bodyPr/>
+          <a:lstStyle/>
+          <a:p>
+            <a:r>
+              <a:t>Como funciona a Inteligência Artificial?</a:t>
+            </a:r>
+          </a:p>
+        </p:txBody>
+      </p:sp>
+      <p:sp>
+        <p:nvSpPr>
+          <p:cNvPr id="3" name="Content Placeholder 2"/>
+          <p:cNvSpPr>
+            <a:spLocks noGrp="1"/>
+          </p:cNvSpPr>
+          <p:nvPr>
+            <p:ph idx="1"/>
+          </p:nvPr>
+        </p:nvSpPr>
+        <p:spPr/>
+        <p:txBody>
+          <a:bodyPr/>
+          <a:lstStyle/>
+          <a:p>
+            <a:r>
+              <a:t>Explicação básica do funcionamento da IA:</a:t>
+            </a:r>
+          </a:p>
+          <a:p>
+            <a:pPr lvl="1"/>
+            <a:r>
+              <a:t>Redes neurais artificiais</a:t>
+            </a:r>
+          </a:p>
+          <a:p>
+            <a:pPr lvl="1"/>
+            <a:r>
+              <a:t>Algoritmos de aprendizado de máquina</a:t>
+            </a:r>
+          </a:p>
+          <a:p>
+            <a:pPr lvl="1"/>
+            <a:r>
+              <a:t>Processamento de dados</a:t>
+            </a:r>
+          </a:p>
+        </p:txBody>
+      </p:sp>
+      <p:pic>
+        <p:nvPicPr>
+          <p:cNvPr id="4" name="Picture 3" descr="ia.jpg"/>
+          <p:cNvPicPr>
+            <a:picLocks noChangeAspect="1"/>
+          </p:cNvPicPr>
+          <p:nvPr/>
+        </p:nvPicPr>
+        <p:blipFill>
+          <a:blip r:embed="rId2"/>
+          <a:stretch>
+            <a:fillRect/>
+          </a:stretch>
+        </p:blipFill>
+        <p:spPr>
+          <a:xfrm>
+            <a:off x="2743200" y="4114800"/>
+            <a:ext cx="3810000" cy="2120900"/>
+          </a:xfrm>
+          <a:prstGeom prst="rect">
+            <a:avLst/>
+          </a:prstGeom>
+        </p:spPr>
+      </p:pic>
     </p:spTree>
   </p:cSld>
   <p:clrMapOvr>

</xml_diff>

<commit_message>
inserindo diversos níveis de tópicos
</commit_message>
<xml_diff>
--- a/Slides/roteiro_apresentacao.pptx
+++ b/Slides/roteiro_apresentacao.pptx
@@ -8,6 +8,7 @@
     <p:sldId id="256" r:id="rId7"/>
     <p:sldId id="257" r:id="rId8"/>
     <p:sldId id="258" r:id="rId9"/>
+    <p:sldId id="259" r:id="rId10"/>
   </p:sldIdLst>
   <p:sldSz cx="9144000" cy="6858000" type="screen4x3"/>
   <p:notesSz cx="6858000" cy="9144000"/>
@@ -3304,6 +3305,107 @@
           </a:prstGeom>
         </p:spPr>
       </p:pic>
+    </p:spTree>
+  </p:cSld>
+  <p:clrMapOvr>
+    <a:masterClrMapping/>
+  </p:clrMapOvr>
+</p:sld>
+</file>
+
+<file path=ppt/slides/slide4.xml><?xml version="1.0" encoding="utf-8"?>
+<p:sld xmlns:a="http://schemas.openxmlformats.org/drawingml/2006/main" xmlns:p="http://schemas.openxmlformats.org/presentationml/2006/main" xmlns:r="http://schemas.openxmlformats.org/officeDocument/2006/relationships">
+  <p:cSld>
+    <p:spTree>
+      <p:nvGrpSpPr>
+        <p:cNvPr id="1" name=""/>
+        <p:cNvGrpSpPr/>
+        <p:nvPr/>
+      </p:nvGrpSpPr>
+      <p:grpSpPr/>
+      <p:sp>
+        <p:nvSpPr>
+          <p:cNvPr id="2" name="Title 1"/>
+          <p:cNvSpPr>
+            <a:spLocks noGrp="1"/>
+          </p:cNvSpPr>
+          <p:nvPr>
+            <p:ph type="title"/>
+          </p:nvPr>
+        </p:nvSpPr>
+        <p:spPr/>
+        <p:txBody>
+          <a:bodyPr/>
+          <a:lstStyle/>
+          <a:p>
+            <a:r>
+              <a:t>Benefícios e Desafios da Inteligência Artificia</a:t>
+            </a:r>
+          </a:p>
+        </p:txBody>
+      </p:sp>
+      <p:sp>
+        <p:nvSpPr>
+          <p:cNvPr id="3" name="Content Placeholder 2"/>
+          <p:cNvSpPr>
+            <a:spLocks noGrp="1"/>
+          </p:cNvSpPr>
+          <p:nvPr>
+            <p:ph idx="1"/>
+          </p:nvPr>
+        </p:nvSpPr>
+        <p:spPr/>
+        <p:txBody>
+          <a:bodyPr/>
+          <a:lstStyle/>
+          <a:p>
+            <a:r>
+              <a:t>Listagem dos principais benefícios da IA:</a:t>
+            </a:r>
+          </a:p>
+          <a:p>
+            <a:pPr lvl="1"/>
+            <a:r>
+              <a:t>Automação de tarefas</a:t>
+            </a:r>
+          </a:p>
+          <a:p>
+            <a:pPr lvl="1"/>
+            <a:r>
+              <a:t>Melhoria da eficiência</a:t>
+            </a:r>
+          </a:p>
+          <a:p>
+            <a:pPr lvl="1"/>
+            <a:r>
+              <a:t>Previsões precisas</a:t>
+            </a:r>
+          </a:p>
+          <a:p>
+            <a:r>
+              <a:t>Destaque para os desafios:</a:t>
+            </a:r>
+          </a:p>
+          <a:p>
+            <a:pPr lvl="1"/>
+            <a:r>
+              <a:t>Privacidade</a:t>
+            </a:r>
+          </a:p>
+          <a:p>
+            <a:pPr lvl="1"/>
+            <a:r>
+              <a:t>Ética</a:t>
+            </a:r>
+          </a:p>
+          <a:p>
+            <a:pPr lvl="1"/>
+            <a:r>
+              <a:t>Impactos no mercado de trabalho</a:t>
+            </a:r>
+          </a:p>
+        </p:txBody>
+      </p:sp>
     </p:spTree>
   </p:cSld>
   <p:clrMapOvr>

</xml_diff>